<commit_message>
Clarified how it works
</commit_message>
<xml_diff>
--- a/Proposal.pptx
+++ b/Proposal.pptx
@@ -4300,7 +4300,33 @@
           <a:p>
             <a:r>
               <a:rPr lang="en-US" dirty="0" smtClean="0"/>
-              <a:t>The game will be built using the Unity game engine, and run on any VR-capable computer</a:t>
+              <a:t>The game will be built using the Unity game engine, and run on any VR-capable </a:t>
+            </a:r>
+            <a:r>
+              <a:rPr lang="en-US" dirty="0" smtClean="0"/>
+              <a:t>computer</a:t>
+            </a:r>
+          </a:p>
+          <a:p>
+            <a:r>
+              <a:rPr lang="en-US" dirty="0" smtClean="0"/>
+              <a:t>Come on, I know you had lightsaber duels as a kid. </a:t>
+            </a:r>
+            <a:r>
+              <a:rPr lang="en-US" dirty="0" err="1" smtClean="0"/>
+              <a:t>Erm</a:t>
+            </a:r>
+            <a:r>
+              <a:rPr lang="en-US" dirty="0" smtClean="0"/>
+              <a:t>, I mean, </a:t>
+            </a:r>
+            <a:r>
+              <a:rPr lang="en-US" dirty="0" err="1" smtClean="0"/>
+              <a:t>sightlabers</a:t>
+            </a:r>
+            <a:r>
+              <a:rPr lang="en-US" dirty="0" smtClean="0"/>
+              <a:t>. Yep. It’s just that, but in VR.</a:t>
             </a:r>
             <a:endParaRPr lang="en-US" dirty="0"/>
           </a:p>
@@ -4315,7 +4341,7 @@
         <p:spPr>
           <a:xfrm>
             <a:off x="178719" y="6311900"/>
-            <a:ext cx="2325765" cy="369332"/>
+            <a:ext cx="6401689" cy="369332"/>
           </a:xfrm>
           <a:prstGeom prst="rect">
             <a:avLst/>
@@ -4330,7 +4356,7 @@
           <a:p>
             <a:r>
               <a:rPr lang="en-US" dirty="0" smtClean="0"/>
-              <a:t>That’s how it all works.</a:t>
+              <a:t>You know, in blindfold mode, I could just play sounds and “fake it”.</a:t>
             </a:r>
             <a:endParaRPr lang="en-US" dirty="0"/>
           </a:p>

</xml_diff>